<commit_message>
some fixes in ppt
</commit_message>
<xml_diff>
--- a/KiralyDavid/minta ppt_Java.pptx
+++ b/KiralyDavid/minta ppt_Java.pptx
@@ -5,16 +5,18 @@
     <p:sldMasterId id="2147483660" r:id="rId4"/>
   </p:sldMasterIdLst>
   <p:notesMasterIdLst>
-    <p:notesMasterId r:id="rId12"/>
+    <p:notesMasterId r:id="rId14"/>
   </p:notesMasterIdLst>
   <p:sldIdLst>
     <p:sldId id="268" r:id="rId5"/>
     <p:sldId id="261" r:id="rId6"/>
-    <p:sldId id="270" r:id="rId7"/>
-    <p:sldId id="267" r:id="rId8"/>
-    <p:sldId id="271" r:id="rId9"/>
-    <p:sldId id="272" r:id="rId10"/>
-    <p:sldId id="258" r:id="rId11"/>
+    <p:sldId id="273" r:id="rId7"/>
+    <p:sldId id="274" r:id="rId8"/>
+    <p:sldId id="267" r:id="rId9"/>
+    <p:sldId id="276" r:id="rId10"/>
+    <p:sldId id="272" r:id="rId11"/>
+    <p:sldId id="277" r:id="rId12"/>
+    <p:sldId id="258" r:id="rId13"/>
   </p:sldIdLst>
   <p:sldSz cx="9144000" cy="5143500" type="screen16x9"/>
   <p:notesSz cx="6858000" cy="9144000"/>
@@ -741,7 +743,7 @@
     </p:spTree>
     <p:extLst>
       <p:ext uri="{BB962C8B-B14F-4D97-AF65-F5344CB8AC3E}">
-        <p14:creationId xmlns:p14="http://schemas.microsoft.com/office/powerpoint/2010/main" val="547795840"/>
+        <p14:creationId xmlns:p14="http://schemas.microsoft.com/office/powerpoint/2010/main" val="412760280"/>
       </p:ext>
     </p:extLst>
   </p:cSld>
@@ -797,7 +799,7 @@
           </a:bodyPr>
           <a:lstStyle/>
           <a:p>
-            <a:endParaRPr lang="hu-HU" b="1" baseline="0" dirty="0"/>
+            <a:endParaRPr lang="hu-HU" baseline="0" dirty="0"/>
           </a:p>
         </p:txBody>
       </p:sp>
@@ -816,7 +818,7 @@
           <a:bodyPr/>
           <a:lstStyle/>
           <a:p>
-            <a:fld id="{E8CDED4D-A8A4-450F-8B8F-33920FA6A611}" type="slidenum">
+            <a:fld id="{37F5BA7A-53FA-4B64-BA9D-1AFB6F476CB1}" type="slidenum">
               <a:rPr lang="hu-HU" smtClean="0"/>
               <a:pPr/>
               <a:t>4</a:t>
@@ -826,6 +828,11 @@
         </p:txBody>
       </p:sp>
     </p:spTree>
+    <p:extLst>
+      <p:ext uri="{BB962C8B-B14F-4D97-AF65-F5344CB8AC3E}">
+        <p14:creationId xmlns:p14="http://schemas.microsoft.com/office/powerpoint/2010/main" val="3079706109"/>
+      </p:ext>
+    </p:extLst>
   </p:cSld>
   <p:clrMapOvr>
     <a:masterClrMapping/>
@@ -908,11 +915,6 @@
         </p:txBody>
       </p:sp>
     </p:spTree>
-    <p:extLst>
-      <p:ext uri="{BB962C8B-B14F-4D97-AF65-F5344CB8AC3E}">
-        <p14:creationId xmlns:p14="http://schemas.microsoft.com/office/powerpoint/2010/main" val="1298547457"/>
-      </p:ext>
-    </p:extLst>
   </p:cSld>
   <p:clrMapOvr>
     <a:masterClrMapping/>
@@ -966,7 +968,7 @@
           </a:bodyPr>
           <a:lstStyle/>
           <a:p>
-            <a:endParaRPr lang="hu-HU" b="1" baseline="0" dirty="0"/>
+            <a:endParaRPr lang="hu-HU" baseline="0" dirty="0"/>
           </a:p>
         </p:txBody>
       </p:sp>
@@ -985,7 +987,7 @@
           <a:bodyPr/>
           <a:lstStyle/>
           <a:p>
-            <a:fld id="{E8CDED4D-A8A4-450F-8B8F-33920FA6A611}" type="slidenum">
+            <a:fld id="{37F5BA7A-53FA-4B64-BA9D-1AFB6F476CB1}" type="slidenum">
               <a:rPr lang="hu-HU" smtClean="0"/>
               <a:pPr/>
               <a:t>6</a:t>
@@ -997,7 +999,181 @@
     </p:spTree>
     <p:extLst>
       <p:ext uri="{BB962C8B-B14F-4D97-AF65-F5344CB8AC3E}">
+        <p14:creationId xmlns:p14="http://schemas.microsoft.com/office/powerpoint/2010/main" val="844578641"/>
+      </p:ext>
+    </p:extLst>
+  </p:cSld>
+  <p:clrMapOvr>
+    <a:masterClrMapping/>
+  </p:clrMapOvr>
+</p:notes>
+</file>
+
+<file path=ppt/notesSlides/notesSlide7.xml><?xml version="1.0" encoding="utf-8"?>
+<p:notes xmlns:a="http://schemas.openxmlformats.org/drawingml/2006/main" xmlns:r="http://schemas.openxmlformats.org/officeDocument/2006/relationships" xmlns:p="http://schemas.openxmlformats.org/presentationml/2006/main">
+  <p:cSld>
+    <p:spTree>
+      <p:nvGrpSpPr>
+        <p:cNvPr id="1" name=""/>
+        <p:cNvGrpSpPr/>
+        <p:nvPr/>
+      </p:nvGrpSpPr>
+      <p:grpSpPr>
+        <a:xfrm>
+          <a:off x="0" y="0"/>
+          <a:ext cx="0" cy="0"/>
+          <a:chOff x="0" y="0"/>
+          <a:chExt cx="0" cy="0"/>
+        </a:xfrm>
+      </p:grpSpPr>
+      <p:sp>
+        <p:nvSpPr>
+          <p:cNvPr id="2" name="Diakép helye 1"/>
+          <p:cNvSpPr>
+            <a:spLocks noGrp="1" noRot="1" noChangeAspect="1"/>
+          </p:cNvSpPr>
+          <p:nvPr>
+            <p:ph type="sldImg"/>
+          </p:nvPr>
+        </p:nvSpPr>
+        <p:spPr/>
+      </p:sp>
+      <p:sp>
+        <p:nvSpPr>
+          <p:cNvPr id="3" name="Jegyzetek helye 2"/>
+          <p:cNvSpPr>
+            <a:spLocks noGrp="1"/>
+          </p:cNvSpPr>
+          <p:nvPr>
+            <p:ph type="body" idx="1"/>
+          </p:nvPr>
+        </p:nvSpPr>
+        <p:spPr/>
+        <p:txBody>
+          <a:bodyPr>
+            <a:normAutofit/>
+          </a:bodyPr>
+          <a:lstStyle/>
+          <a:p>
+            <a:endParaRPr lang="hu-HU" b="1" baseline="0" dirty="0"/>
+          </a:p>
+        </p:txBody>
+      </p:sp>
+      <p:sp>
+        <p:nvSpPr>
+          <p:cNvPr id="4" name="Dia számának helye 3"/>
+          <p:cNvSpPr>
+            <a:spLocks noGrp="1"/>
+          </p:cNvSpPr>
+          <p:nvPr>
+            <p:ph type="sldNum" sz="quarter" idx="10"/>
+          </p:nvPr>
+        </p:nvSpPr>
+        <p:spPr/>
+        <p:txBody>
+          <a:bodyPr/>
+          <a:lstStyle/>
+          <a:p>
+            <a:fld id="{E8CDED4D-A8A4-450F-8B8F-33920FA6A611}" type="slidenum">
+              <a:rPr lang="hu-HU" smtClean="0"/>
+              <a:pPr/>
+              <a:t>7</a:t>
+            </a:fld>
+            <a:endParaRPr lang="hu-HU"/>
+          </a:p>
+        </p:txBody>
+      </p:sp>
+    </p:spTree>
+    <p:extLst>
+      <p:ext uri="{BB962C8B-B14F-4D97-AF65-F5344CB8AC3E}">
         <p14:creationId xmlns:p14="http://schemas.microsoft.com/office/powerpoint/2010/main" val="119431799"/>
+      </p:ext>
+    </p:extLst>
+  </p:cSld>
+  <p:clrMapOvr>
+    <a:masterClrMapping/>
+  </p:clrMapOvr>
+</p:notes>
+</file>
+
+<file path=ppt/notesSlides/notesSlide8.xml><?xml version="1.0" encoding="utf-8"?>
+<p:notes xmlns:a="http://schemas.openxmlformats.org/drawingml/2006/main" xmlns:r="http://schemas.openxmlformats.org/officeDocument/2006/relationships" xmlns:p="http://schemas.openxmlformats.org/presentationml/2006/main">
+  <p:cSld>
+    <p:spTree>
+      <p:nvGrpSpPr>
+        <p:cNvPr id="1" name=""/>
+        <p:cNvGrpSpPr/>
+        <p:nvPr/>
+      </p:nvGrpSpPr>
+      <p:grpSpPr>
+        <a:xfrm>
+          <a:off x="0" y="0"/>
+          <a:ext cx="0" cy="0"/>
+          <a:chOff x="0" y="0"/>
+          <a:chExt cx="0" cy="0"/>
+        </a:xfrm>
+      </p:grpSpPr>
+      <p:sp>
+        <p:nvSpPr>
+          <p:cNvPr id="2" name="Diakép helye 1"/>
+          <p:cNvSpPr>
+            <a:spLocks noGrp="1" noRot="1" noChangeAspect="1"/>
+          </p:cNvSpPr>
+          <p:nvPr>
+            <p:ph type="sldImg"/>
+          </p:nvPr>
+        </p:nvSpPr>
+        <p:spPr/>
+      </p:sp>
+      <p:sp>
+        <p:nvSpPr>
+          <p:cNvPr id="3" name="Jegyzetek helye 2"/>
+          <p:cNvSpPr>
+            <a:spLocks noGrp="1"/>
+          </p:cNvSpPr>
+          <p:nvPr>
+            <p:ph type="body" idx="1"/>
+          </p:nvPr>
+        </p:nvSpPr>
+        <p:spPr/>
+        <p:txBody>
+          <a:bodyPr>
+            <a:normAutofit/>
+          </a:bodyPr>
+          <a:lstStyle/>
+          <a:p>
+            <a:endParaRPr lang="hu-HU" baseline="0" dirty="0"/>
+          </a:p>
+        </p:txBody>
+      </p:sp>
+      <p:sp>
+        <p:nvSpPr>
+          <p:cNvPr id="4" name="Dia számának helye 3"/>
+          <p:cNvSpPr>
+            <a:spLocks noGrp="1"/>
+          </p:cNvSpPr>
+          <p:nvPr>
+            <p:ph type="sldNum" sz="quarter" idx="10"/>
+          </p:nvPr>
+        </p:nvSpPr>
+        <p:spPr/>
+        <p:txBody>
+          <a:bodyPr/>
+          <a:lstStyle/>
+          <a:p>
+            <a:fld id="{37F5BA7A-53FA-4B64-BA9D-1AFB6F476CB1}" type="slidenum">
+              <a:rPr lang="hu-HU" smtClean="0"/>
+              <a:pPr/>
+              <a:t>8</a:t>
+            </a:fld>
+            <a:endParaRPr lang="hu-HU"/>
+          </a:p>
+        </p:txBody>
+      </p:sp>
+    </p:spTree>
+    <p:extLst>
+      <p:ext uri="{BB962C8B-B14F-4D97-AF65-F5344CB8AC3E}">
+        <p14:creationId xmlns:p14="http://schemas.microsoft.com/office/powerpoint/2010/main" val="2676955589"/>
       </p:ext>
     </p:extLst>
   </p:cSld>
@@ -4012,7 +4188,7 @@
         </p:nvSpPr>
         <p:spPr>
           <a:xfrm>
-            <a:off x="238898" y="858795"/>
+            <a:off x="2532393" y="1024933"/>
             <a:ext cx="3814688" cy="434696"/>
           </a:xfrm>
         </p:spPr>
@@ -4023,7 +4199,7 @@
           <a:lstStyle/>
           <a:p>
             <a:r>
-              <a:rPr lang="hu-HU" sz="3200" dirty="0"/>
+              <a:rPr lang="hu-HU" sz="3200" u="sng" dirty="0"/>
               <a:t>Feladataink:</a:t>
             </a:r>
           </a:p>
@@ -4161,8 +4337,8 @@
         </p:nvSpPr>
         <p:spPr>
           <a:xfrm>
-            <a:off x="359764" y="1459630"/>
-            <a:ext cx="8604354" cy="1200329"/>
+            <a:off x="484221" y="2049507"/>
+            <a:ext cx="8604354" cy="1815882"/>
           </a:xfrm>
           <a:prstGeom prst="rect">
             <a:avLst/>
@@ -4180,7 +4356,7 @@
               <a:buChar char="•"/>
             </a:pPr>
             <a:r>
-              <a:rPr lang="hu-HU" dirty="0"/>
+              <a:rPr lang="hu-HU" sz="2800" dirty="0"/>
               <a:t>Hibajegyek felvétele</a:t>
             </a:r>
           </a:p>
@@ -4190,7 +4366,7 @@
               <a:buChar char="•"/>
             </a:pPr>
             <a:r>
-              <a:rPr lang="hu-HU" dirty="0"/>
+              <a:rPr lang="hu-HU" sz="2800" dirty="0"/>
               <a:t>Tárolása</a:t>
             </a:r>
           </a:p>
@@ -4200,7 +4376,7 @@
               <a:buChar char="•"/>
             </a:pPr>
             <a:r>
-              <a:rPr lang="hu-HU" dirty="0"/>
+              <a:rPr lang="hu-HU" sz="2800" dirty="0"/>
               <a:t>Kezelése</a:t>
             </a:r>
           </a:p>
@@ -4210,10 +4386,10 @@
               <a:buChar char="•"/>
             </a:pPr>
             <a:r>
-              <a:rPr lang="hu-HU" dirty="0"/>
+              <a:rPr lang="hu-HU" sz="2800" dirty="0"/>
               <a:t>Statisztikák készítése </a:t>
             </a:r>
-            <a:endParaRPr lang="hu-HU" dirty="0"/>
+            <a:endParaRPr lang="hu-HU" sz="2800" dirty="0"/>
           </a:p>
         </p:txBody>
       </p:sp>
@@ -4308,7 +4484,7 @@
         </p:nvSpPr>
         <p:spPr>
           <a:xfrm>
-            <a:off x="238898" y="858795"/>
+            <a:off x="2532393" y="1024933"/>
             <a:ext cx="3814688" cy="434696"/>
           </a:xfrm>
         </p:spPr>
@@ -4319,7 +4495,7 @@
           <a:lstStyle/>
           <a:p>
             <a:r>
-              <a:rPr lang="hu-HU" sz="3200" dirty="0"/>
+              <a:rPr lang="hu-HU" sz="3200" u="sng" dirty="0"/>
               <a:t>Csapatmunka</a:t>
             </a:r>
           </a:p>
@@ -4457,8 +4633,8 @@
         </p:nvSpPr>
         <p:spPr>
           <a:xfrm>
-            <a:off x="484221" y="1459630"/>
-            <a:ext cx="7037173" cy="1200329"/>
+            <a:off x="484221" y="2049507"/>
+            <a:ext cx="8604354" cy="1815882"/>
           </a:xfrm>
           <a:prstGeom prst="rect">
             <a:avLst/>
@@ -4476,14 +4652,14 @@
               <a:buChar char="•"/>
             </a:pPr>
             <a:r>
-              <a:rPr lang="hu-HU" dirty="0"/>
+              <a:rPr lang="hu-HU" sz="2800" dirty="0"/>
               <a:t>Nagyobb feladatok felbontása kisebb </a:t>
             </a:r>
             <a:r>
-              <a:rPr lang="hu-HU" dirty="0" err="1"/>
+              <a:rPr lang="hu-HU" sz="2800" dirty="0" err="1"/>
               <a:t>taskokra</a:t>
             </a:r>
-            <a:endParaRPr lang="hu-HU" dirty="0"/>
+            <a:endParaRPr lang="hu-HU" sz="2800" dirty="0"/>
           </a:p>
           <a:p>
             <a:pPr marL="285750" indent="-285750">
@@ -4491,7 +4667,7 @@
               <a:buChar char="•"/>
             </a:pPr>
             <a:r>
-              <a:rPr lang="hu-HU" dirty="0"/>
+              <a:rPr lang="hu-HU" sz="2800" dirty="0"/>
               <a:t>Tesztek írása a szolgáltatásokhoz</a:t>
             </a:r>
           </a:p>
@@ -4501,15 +4677,15 @@
               <a:buChar char="•"/>
             </a:pPr>
             <a:r>
-              <a:rPr lang="hu-HU" dirty="0"/>
+              <a:rPr lang="hu-HU" sz="2800" dirty="0"/>
               <a:t>Heti </a:t>
             </a:r>
             <a:r>
-              <a:rPr lang="hu-HU" dirty="0" err="1"/>
+              <a:rPr lang="hu-HU" sz="2800" dirty="0" err="1"/>
               <a:t>demózás</a:t>
             </a:r>
             <a:r>
-              <a:rPr lang="hu-HU" dirty="0"/>
+              <a:rPr lang="hu-HU" sz="2800" dirty="0"/>
               <a:t> (SCRUM)</a:t>
             </a:r>
           </a:p>
@@ -4519,10 +4695,10 @@
               <a:buChar char="•"/>
             </a:pPr>
             <a:r>
-              <a:rPr lang="hu-HU" dirty="0"/>
+              <a:rPr lang="hu-HU" sz="2800" dirty="0"/>
               <a:t>Iteratív fejlesztés</a:t>
             </a:r>
-            <a:endParaRPr lang="hu-HU" dirty="0"/>
+            <a:endParaRPr lang="hu-HU" sz="2800" dirty="0"/>
           </a:p>
         </p:txBody>
       </p:sp>
@@ -4575,43 +4751,10 @@
           </a:p>
         </p:txBody>
       </p:sp>
-      <p:sp>
-        <p:nvSpPr>
-          <p:cNvPr id="9" name="Szövegdoboz 8"/>
-          <p:cNvSpPr txBox="1"/>
-          <p:nvPr/>
-        </p:nvSpPr>
-        <p:spPr>
-          <a:xfrm>
-            <a:off x="484221" y="2826098"/>
-            <a:ext cx="7310664" cy="369332"/>
-          </a:xfrm>
-          <a:prstGeom prst="rect">
-            <a:avLst/>
-          </a:prstGeom>
-          <a:noFill/>
-        </p:spPr>
-        <p:txBody>
-          <a:bodyPr wrap="square" rtlCol="0">
-            <a:spAutoFit/>
-          </a:bodyPr>
-          <a:lstStyle/>
-          <a:p>
-            <a:pPr marL="285750" indent="-285750">
-              <a:buFont typeface="Wingdings" panose="05000000000000000000" pitchFamily="2" charset="2"/>
-              <a:buChar char="q"/>
-            </a:pPr>
-            <a:r>
-              <a:rPr lang="hu-HU" dirty="0"/>
-              <a:t>Felhasznált technológiák: </a:t>
-            </a:r>
-          </a:p>
-        </p:txBody>
-      </p:sp>
     </p:spTree>
     <p:extLst>
       <p:ext uri="{BB962C8B-B14F-4D97-AF65-F5344CB8AC3E}">
-        <p14:creationId xmlns:p14="http://schemas.microsoft.com/office/powerpoint/2010/main" val="2025365091"/>
+        <p14:creationId xmlns:p14="http://schemas.microsoft.com/office/powerpoint/2010/main" val="2264784461"/>
       </p:ext>
     </p:extLst>
   </p:cSld>
@@ -4622,6 +4765,264 @@
 </file>
 
 <file path=ppt/slides/slide4.xml><?xml version="1.0" encoding="utf-8"?>
+<p:sld xmlns:a="http://schemas.openxmlformats.org/drawingml/2006/main" xmlns:r="http://schemas.openxmlformats.org/officeDocument/2006/relationships" xmlns:p="http://schemas.openxmlformats.org/presentationml/2006/main">
+  <p:cSld>
+    <p:spTree>
+      <p:nvGrpSpPr>
+        <p:cNvPr id="1" name=""/>
+        <p:cNvGrpSpPr/>
+        <p:nvPr/>
+      </p:nvGrpSpPr>
+      <p:grpSpPr>
+        <a:xfrm>
+          <a:off x="0" y="0"/>
+          <a:ext cx="0" cy="0"/>
+          <a:chOff x="0" y="0"/>
+          <a:chExt cx="0" cy="0"/>
+        </a:xfrm>
+      </p:grpSpPr>
+      <p:sp>
+        <p:nvSpPr>
+          <p:cNvPr id="3" name="Alcím 2"/>
+          <p:cNvSpPr>
+            <a:spLocks noGrp="1"/>
+          </p:cNvSpPr>
+          <p:nvPr>
+            <p:ph type="subTitle" idx="1"/>
+          </p:nvPr>
+        </p:nvSpPr>
+        <p:spPr>
+          <a:xfrm>
+            <a:off x="2532393" y="1024933"/>
+            <a:ext cx="3814688" cy="434696"/>
+          </a:xfrm>
+        </p:spPr>
+        <p:txBody>
+          <a:bodyPr>
+            <a:noAutofit/>
+          </a:bodyPr>
+          <a:lstStyle/>
+          <a:p>
+            <a:r>
+              <a:rPr lang="hu-HU" sz="3200" u="sng" dirty="0"/>
+              <a:t>Felhasznált technológiák: </a:t>
+            </a:r>
+          </a:p>
+        </p:txBody>
+      </p:sp>
+      <p:sp>
+        <p:nvSpPr>
+          <p:cNvPr id="5" name="Tartalom helye 2"/>
+          <p:cNvSpPr txBox="1">
+            <a:spLocks/>
+          </p:cNvSpPr>
+          <p:nvPr/>
+        </p:nvSpPr>
+        <p:spPr>
+          <a:xfrm>
+            <a:off x="484221" y="1459630"/>
+            <a:ext cx="5388758" cy="2995637"/>
+          </a:xfrm>
+          <a:prstGeom prst="rect">
+            <a:avLst/>
+          </a:prstGeom>
+        </p:spPr>
+        <p:txBody>
+          <a:bodyPr vert="horz" lIns="91440" tIns="45720" rIns="91440" bIns="45720" rtlCol="0">
+            <a:noAutofit/>
+          </a:bodyPr>
+          <a:lstStyle/>
+          <a:p>
+            <a:pPr marL="0" marR="0" lvl="0" indent="0" defTabSz="914400" rtl="0" eaLnBrk="1" fontAlgn="auto" latinLnBrk="0" hangingPunct="1">
+              <a:lnSpc>
+                <a:spcPct val="90000"/>
+              </a:lnSpc>
+              <a:spcBef>
+                <a:spcPts val="1000"/>
+              </a:spcBef>
+              <a:spcAft>
+                <a:spcPts val="0"/>
+              </a:spcAft>
+              <a:buClrTx/>
+              <a:buSzTx/>
+              <a:buFont typeface="Arial" pitchFamily="34" charset="0"/>
+              <a:buChar char="•"/>
+              <a:tabLst/>
+              <a:defRPr/>
+            </a:pPr>
+            <a:endParaRPr lang="hu-HU" sz="2400" dirty="0"/>
+          </a:p>
+          <a:p>
+            <a:pPr marL="0" marR="0" lvl="0" indent="0" defTabSz="914400" rtl="0" eaLnBrk="1" fontAlgn="auto" latinLnBrk="0" hangingPunct="1">
+              <a:lnSpc>
+                <a:spcPct val="90000"/>
+              </a:lnSpc>
+              <a:spcBef>
+                <a:spcPts val="1000"/>
+              </a:spcBef>
+              <a:spcAft>
+                <a:spcPts val="0"/>
+              </a:spcAft>
+              <a:buClrTx/>
+              <a:buSzTx/>
+              <a:buFont typeface="Arial" pitchFamily="34" charset="0"/>
+              <a:buChar char="•"/>
+              <a:tabLst/>
+              <a:defRPr/>
+            </a:pPr>
+            <a:endParaRPr lang="hu-HU" sz="2400" dirty="0"/>
+          </a:p>
+          <a:p>
+            <a:pPr marL="0" marR="0" lvl="0" indent="0" defTabSz="914400" rtl="0" eaLnBrk="1" fontAlgn="auto" latinLnBrk="0" hangingPunct="1">
+              <a:lnSpc>
+                <a:spcPct val="90000"/>
+              </a:lnSpc>
+              <a:spcBef>
+                <a:spcPts val="1000"/>
+              </a:spcBef>
+              <a:spcAft>
+                <a:spcPts val="0"/>
+              </a:spcAft>
+              <a:buClrTx/>
+              <a:buSzTx/>
+              <a:buFont typeface="Arial" pitchFamily="34" charset="0"/>
+              <a:buChar char="•"/>
+              <a:tabLst/>
+              <a:defRPr/>
+            </a:pPr>
+            <a:endParaRPr lang="hu-HU" sz="2400" dirty="0"/>
+          </a:p>
+          <a:p>
+            <a:pPr marL="0" marR="0" lvl="0" indent="0" defTabSz="914400" rtl="0" eaLnBrk="1" fontAlgn="auto" latinLnBrk="0" hangingPunct="1">
+              <a:lnSpc>
+                <a:spcPct val="90000"/>
+              </a:lnSpc>
+              <a:spcBef>
+                <a:spcPts val="1000"/>
+              </a:spcBef>
+              <a:spcAft>
+                <a:spcPts val="0"/>
+              </a:spcAft>
+              <a:buClrTx/>
+              <a:buSzTx/>
+              <a:buFont typeface="Arial" pitchFamily="34" charset="0"/>
+              <a:buChar char="•"/>
+              <a:tabLst/>
+              <a:defRPr/>
+            </a:pPr>
+            <a:endParaRPr lang="hu-HU" sz="2400" dirty="0"/>
+          </a:p>
+          <a:p>
+            <a:pPr marL="0" marR="0" lvl="0" indent="0" defTabSz="914400" rtl="0" eaLnBrk="1" fontAlgn="auto" latinLnBrk="0" hangingPunct="1">
+              <a:lnSpc>
+                <a:spcPct val="90000"/>
+              </a:lnSpc>
+              <a:spcBef>
+                <a:spcPts val="1000"/>
+              </a:spcBef>
+              <a:spcAft>
+                <a:spcPts val="0"/>
+              </a:spcAft>
+              <a:buClrTx/>
+              <a:buSzTx/>
+              <a:buFont typeface="Arial" pitchFamily="34" charset="0"/>
+              <a:buChar char="•"/>
+              <a:tabLst/>
+              <a:defRPr/>
+            </a:pPr>
+            <a:endParaRPr lang="hu-HU" sz="2400" baseline="0" dirty="0"/>
+          </a:p>
+        </p:txBody>
+      </p:sp>
+      <p:sp>
+        <p:nvSpPr>
+          <p:cNvPr id="4" name="Szövegdoboz 3"/>
+          <p:cNvSpPr txBox="1"/>
+          <p:nvPr/>
+        </p:nvSpPr>
+        <p:spPr>
+          <a:xfrm>
+            <a:off x="484221" y="2049507"/>
+            <a:ext cx="8604354" cy="523220"/>
+          </a:xfrm>
+          <a:prstGeom prst="rect">
+            <a:avLst/>
+          </a:prstGeom>
+          <a:noFill/>
+        </p:spPr>
+        <p:txBody>
+          <a:bodyPr wrap="square" rtlCol="0">
+            <a:spAutoFit/>
+          </a:bodyPr>
+          <a:lstStyle/>
+          <a:p>
+            <a:endParaRPr lang="hu-HU" sz="2800" dirty="0"/>
+          </a:p>
+        </p:txBody>
+      </p:sp>
+      <p:sp>
+        <p:nvSpPr>
+          <p:cNvPr id="6" name="Cím 1"/>
+          <p:cNvSpPr txBox="1">
+            <a:spLocks/>
+          </p:cNvSpPr>
+          <p:nvPr/>
+        </p:nvSpPr>
+        <p:spPr>
+          <a:xfrm rot="20305361">
+            <a:off x="7446477" y="153351"/>
+            <a:ext cx="1548465" cy="417968"/>
+          </a:xfrm>
+          <a:prstGeom prst="rect">
+            <a:avLst/>
+          </a:prstGeom>
+        </p:spPr>
+        <p:txBody>
+          <a:bodyPr vert="horz" lIns="91440" tIns="45720" rIns="91440" bIns="45720" rtlCol="0" anchor="b">
+            <a:normAutofit/>
+          </a:bodyPr>
+          <a:lstStyle>
+            <a:lvl1pPr algn="ctr" defTabSz="914400" rtl="0" eaLnBrk="1" latinLnBrk="0" hangingPunct="1">
+              <a:lnSpc>
+                <a:spcPct val="90000"/>
+              </a:lnSpc>
+              <a:spcBef>
+                <a:spcPct val="0"/>
+              </a:spcBef>
+              <a:buNone/>
+              <a:defRPr sz="6000" kern="1200">
+                <a:solidFill>
+                  <a:schemeClr val="tx1"/>
+                </a:solidFill>
+                <a:latin typeface="+mj-lt"/>
+                <a:ea typeface="+mj-ea"/>
+                <a:cs typeface="+mj-cs"/>
+              </a:defRPr>
+            </a:lvl1pPr>
+          </a:lstStyle>
+          <a:p>
+            <a:r>
+              <a:rPr lang="hu-HU" sz="1800"/>
+              <a:t>Issue Tracker</a:t>
+            </a:r>
+            <a:endParaRPr lang="hu-HU" sz="1800" dirty="0"/>
+          </a:p>
+        </p:txBody>
+      </p:sp>
+    </p:spTree>
+    <p:extLst>
+      <p:ext uri="{BB962C8B-B14F-4D97-AF65-F5344CB8AC3E}">
+        <p14:creationId xmlns:p14="http://schemas.microsoft.com/office/powerpoint/2010/main" val="2425699270"/>
+      </p:ext>
+    </p:extLst>
+  </p:cSld>
+  <p:clrMapOvr>
+    <a:masterClrMapping/>
+  </p:clrMapOvr>
+</p:sld>
+</file>
+
+<file path=ppt/slides/slide5.xml><?xml version="1.0" encoding="utf-8"?>
 <p:sld xmlns:a="http://schemas.openxmlformats.org/drawingml/2006/main" xmlns:r="http://schemas.openxmlformats.org/officeDocument/2006/relationships" xmlns:p="http://schemas.openxmlformats.org/presentationml/2006/main">
   <p:cSld>
     <p:spTree>
@@ -4772,207 +5173,6 @@
 </p:sld>
 </file>
 
-<file path=ppt/slides/slide5.xml><?xml version="1.0" encoding="utf-8"?>
-<p:sld xmlns:a="http://schemas.openxmlformats.org/drawingml/2006/main" xmlns:r="http://schemas.openxmlformats.org/officeDocument/2006/relationships" xmlns:p="http://schemas.openxmlformats.org/presentationml/2006/main">
-  <p:cSld>
-    <p:spTree>
-      <p:nvGrpSpPr>
-        <p:cNvPr id="1" name=""/>
-        <p:cNvGrpSpPr/>
-        <p:nvPr/>
-      </p:nvGrpSpPr>
-      <p:grpSpPr>
-        <a:xfrm>
-          <a:off x="0" y="0"/>
-          <a:ext cx="0" cy="0"/>
-          <a:chOff x="0" y="0"/>
-          <a:chExt cx="0" cy="0"/>
-        </a:xfrm>
-      </p:grpSpPr>
-      <p:sp>
-        <p:nvSpPr>
-          <p:cNvPr id="2" name="Cím 1"/>
-          <p:cNvSpPr>
-            <a:spLocks noGrp="1"/>
-          </p:cNvSpPr>
-          <p:nvPr>
-            <p:ph type="ctrTitle"/>
-          </p:nvPr>
-        </p:nvSpPr>
-        <p:spPr>
-          <a:xfrm rot="20305361">
-            <a:off x="7446477" y="153351"/>
-            <a:ext cx="1548465" cy="417968"/>
-          </a:xfrm>
-        </p:spPr>
-        <p:txBody>
-          <a:bodyPr>
-            <a:normAutofit/>
-          </a:bodyPr>
-          <a:lstStyle/>
-          <a:p>
-            <a:r>
-              <a:rPr lang="hu-HU" sz="1800" dirty="0" err="1"/>
-              <a:t>Issue</a:t>
-            </a:r>
-            <a:r>
-              <a:rPr lang="hu-HU" sz="1800" dirty="0"/>
-              <a:t> </a:t>
-            </a:r>
-            <a:r>
-              <a:rPr lang="hu-HU" sz="1800" dirty="0" err="1"/>
-              <a:t>Tracker</a:t>
-            </a:r>
-            <a:endParaRPr lang="hu-HU" sz="1800" dirty="0"/>
-          </a:p>
-        </p:txBody>
-      </p:sp>
-      <p:sp>
-        <p:nvSpPr>
-          <p:cNvPr id="4" name="Alcím 2"/>
-          <p:cNvSpPr>
-            <a:spLocks noGrp="1"/>
-          </p:cNvSpPr>
-          <p:nvPr>
-            <p:ph type="subTitle" idx="1"/>
-          </p:nvPr>
-        </p:nvSpPr>
-        <p:spPr>
-          <a:xfrm>
-            <a:off x="238898" y="858795"/>
-            <a:ext cx="3814688" cy="434696"/>
-          </a:xfrm>
-        </p:spPr>
-        <p:txBody>
-          <a:bodyPr>
-            <a:noAutofit/>
-          </a:bodyPr>
-          <a:lstStyle/>
-          <a:p>
-            <a:r>
-              <a:rPr lang="hu-HU" sz="3200" dirty="0"/>
-              <a:t>Főbb feladataim:</a:t>
-            </a:r>
-          </a:p>
-        </p:txBody>
-      </p:sp>
-      <p:sp>
-        <p:nvSpPr>
-          <p:cNvPr id="5" name="Szövegdoboz 4"/>
-          <p:cNvSpPr txBox="1"/>
-          <p:nvPr/>
-        </p:nvSpPr>
-        <p:spPr>
-          <a:xfrm>
-            <a:off x="464695" y="1424066"/>
-            <a:ext cx="7869836" cy="2031325"/>
-          </a:xfrm>
-          <a:prstGeom prst="rect">
-            <a:avLst/>
-          </a:prstGeom>
-          <a:noFill/>
-        </p:spPr>
-        <p:txBody>
-          <a:bodyPr wrap="square" rtlCol="0">
-            <a:spAutoFit/>
-          </a:bodyPr>
-          <a:lstStyle/>
-          <a:p>
-            <a:pPr marL="285750" indent="-285750">
-              <a:buFont typeface="Arial" panose="020B0604020202020204" pitchFamily="34" charset="0"/>
-              <a:buChar char="•"/>
-            </a:pPr>
-            <a:r>
-              <a:rPr lang="hu-HU" dirty="0"/>
-              <a:t>Hibajegyek létrehozása (felület és implementáció)</a:t>
-            </a:r>
-          </a:p>
-          <a:p>
-            <a:pPr marL="285750" indent="-285750">
-              <a:buFont typeface="Arial" panose="020B0604020202020204" pitchFamily="34" charset="0"/>
-              <a:buChar char="•"/>
-            </a:pPr>
-            <a:r>
-              <a:rPr lang="hu-HU" dirty="0"/>
-              <a:t>Hibajegyek módosítása + </a:t>
-            </a:r>
-            <a:r>
-              <a:rPr lang="hu-HU" dirty="0" err="1"/>
-              <a:t>Userek</a:t>
-            </a:r>
-            <a:r>
-              <a:rPr lang="hu-HU" dirty="0"/>
-              <a:t> </a:t>
-            </a:r>
-            <a:r>
-              <a:rPr lang="hu-HU" dirty="0" err="1"/>
-              <a:t>tickethez</a:t>
-            </a:r>
-            <a:r>
-              <a:rPr lang="hu-HU" dirty="0"/>
-              <a:t> rendelése</a:t>
-            </a:r>
-          </a:p>
-          <a:p>
-            <a:pPr marL="285750" indent="-285750">
-              <a:buFont typeface="Arial" panose="020B0604020202020204" pitchFamily="34" charset="0"/>
-              <a:buChar char="•"/>
-            </a:pPr>
-            <a:r>
-              <a:rPr lang="hu-HU" dirty="0" err="1"/>
-              <a:t>Logolás</a:t>
-            </a:r>
-            <a:r>
-              <a:rPr lang="hu-HU" dirty="0"/>
-              <a:t> kialakítása a projektben</a:t>
-            </a:r>
-          </a:p>
-          <a:p>
-            <a:pPr marL="285750" indent="-285750">
-              <a:buFont typeface="Arial" panose="020B0604020202020204" pitchFamily="34" charset="0"/>
-              <a:buChar char="•"/>
-            </a:pPr>
-            <a:r>
-              <a:rPr lang="hu-HU" dirty="0" err="1"/>
-              <a:t>Junit</a:t>
-            </a:r>
-            <a:r>
-              <a:rPr lang="hu-HU" dirty="0"/>
-              <a:t> tesztek írása</a:t>
-            </a:r>
-          </a:p>
-          <a:p>
-            <a:endParaRPr lang="hu-HU" dirty="0"/>
-          </a:p>
-          <a:p>
-            <a:pPr marL="285750" indent="-285750">
-              <a:buFont typeface="Arial" panose="020B0604020202020204" pitchFamily="34" charset="0"/>
-              <a:buChar char="•"/>
-            </a:pPr>
-            <a:endParaRPr lang="hu-HU" dirty="0"/>
-          </a:p>
-          <a:p>
-            <a:pPr marL="285750" indent="-285750">
-              <a:buFont typeface="Arial" panose="020B0604020202020204" pitchFamily="34" charset="0"/>
-              <a:buChar char="•"/>
-            </a:pPr>
-            <a:endParaRPr lang="hu-HU" dirty="0"/>
-          </a:p>
-        </p:txBody>
-      </p:sp>
-    </p:spTree>
-    <p:extLst>
-      <p:ext uri="{BB962C8B-B14F-4D97-AF65-F5344CB8AC3E}">
-        <p14:creationId xmlns:p14="http://schemas.microsoft.com/office/powerpoint/2010/main" val="2083935363"/>
-      </p:ext>
-    </p:extLst>
-  </p:cSld>
-  <p:clrMapOvr>
-    <a:masterClrMapping/>
-  </p:clrMapOvr>
-</p:sld>
-</file>
-
 <file path=ppt/slides/slide6.xml><?xml version="1.0" encoding="utf-8"?>
 <p:sld xmlns:a="http://schemas.openxmlformats.org/drawingml/2006/main" xmlns:r="http://schemas.openxmlformats.org/officeDocument/2006/relationships" xmlns:p="http://schemas.openxmlformats.org/presentationml/2006/main">
   <p:cSld>
@@ -4992,6 +5192,328 @@
       </p:grpSpPr>
       <p:sp>
         <p:nvSpPr>
+          <p:cNvPr id="3" name="Alcím 2"/>
+          <p:cNvSpPr>
+            <a:spLocks noGrp="1"/>
+          </p:cNvSpPr>
+          <p:nvPr>
+            <p:ph type="subTitle" idx="1"/>
+          </p:nvPr>
+        </p:nvSpPr>
+        <p:spPr>
+          <a:xfrm>
+            <a:off x="2532393" y="1024933"/>
+            <a:ext cx="3814688" cy="434696"/>
+          </a:xfrm>
+        </p:spPr>
+        <p:txBody>
+          <a:bodyPr>
+            <a:noAutofit/>
+          </a:bodyPr>
+          <a:lstStyle/>
+          <a:p>
+            <a:r>
+              <a:rPr lang="hu-HU" sz="3200" u="sng" dirty="0"/>
+              <a:t>Főbb feladataim:</a:t>
+            </a:r>
+          </a:p>
+          <a:p>
+            <a:endParaRPr lang="hu-HU" sz="3200" dirty="0"/>
+          </a:p>
+        </p:txBody>
+      </p:sp>
+      <p:sp>
+        <p:nvSpPr>
+          <p:cNvPr id="5" name="Tartalom helye 2"/>
+          <p:cNvSpPr txBox="1">
+            <a:spLocks/>
+          </p:cNvSpPr>
+          <p:nvPr/>
+        </p:nvSpPr>
+        <p:spPr>
+          <a:xfrm>
+            <a:off x="484221" y="1459630"/>
+            <a:ext cx="5388758" cy="2995637"/>
+          </a:xfrm>
+          <a:prstGeom prst="rect">
+            <a:avLst/>
+          </a:prstGeom>
+        </p:spPr>
+        <p:txBody>
+          <a:bodyPr vert="horz" lIns="91440" tIns="45720" rIns="91440" bIns="45720" rtlCol="0">
+            <a:noAutofit/>
+          </a:bodyPr>
+          <a:lstStyle/>
+          <a:p>
+            <a:pPr marL="0" marR="0" lvl="0" indent="0" defTabSz="914400" rtl="0" eaLnBrk="1" fontAlgn="auto" latinLnBrk="0" hangingPunct="1">
+              <a:lnSpc>
+                <a:spcPct val="90000"/>
+              </a:lnSpc>
+              <a:spcBef>
+                <a:spcPts val="1000"/>
+              </a:spcBef>
+              <a:spcAft>
+                <a:spcPts val="0"/>
+              </a:spcAft>
+              <a:buClrTx/>
+              <a:buSzTx/>
+              <a:buFont typeface="Arial" pitchFamily="34" charset="0"/>
+              <a:buChar char="•"/>
+              <a:tabLst/>
+              <a:defRPr/>
+            </a:pPr>
+            <a:endParaRPr lang="hu-HU" sz="2400" dirty="0"/>
+          </a:p>
+          <a:p>
+            <a:pPr marL="0" marR="0" lvl="0" indent="0" defTabSz="914400" rtl="0" eaLnBrk="1" fontAlgn="auto" latinLnBrk="0" hangingPunct="1">
+              <a:lnSpc>
+                <a:spcPct val="90000"/>
+              </a:lnSpc>
+              <a:spcBef>
+                <a:spcPts val="1000"/>
+              </a:spcBef>
+              <a:spcAft>
+                <a:spcPts val="0"/>
+              </a:spcAft>
+              <a:buClrTx/>
+              <a:buSzTx/>
+              <a:buFont typeface="Arial" pitchFamily="34" charset="0"/>
+              <a:buChar char="•"/>
+              <a:tabLst/>
+              <a:defRPr/>
+            </a:pPr>
+            <a:endParaRPr lang="hu-HU" sz="2400" dirty="0"/>
+          </a:p>
+          <a:p>
+            <a:pPr marL="0" marR="0" lvl="0" indent="0" defTabSz="914400" rtl="0" eaLnBrk="1" fontAlgn="auto" latinLnBrk="0" hangingPunct="1">
+              <a:lnSpc>
+                <a:spcPct val="90000"/>
+              </a:lnSpc>
+              <a:spcBef>
+                <a:spcPts val="1000"/>
+              </a:spcBef>
+              <a:spcAft>
+                <a:spcPts val="0"/>
+              </a:spcAft>
+              <a:buClrTx/>
+              <a:buSzTx/>
+              <a:buFont typeface="Arial" pitchFamily="34" charset="0"/>
+              <a:buChar char="•"/>
+              <a:tabLst/>
+              <a:defRPr/>
+            </a:pPr>
+            <a:endParaRPr lang="hu-HU" sz="2400" dirty="0"/>
+          </a:p>
+          <a:p>
+            <a:pPr marL="0" marR="0" lvl="0" indent="0" defTabSz="914400" rtl="0" eaLnBrk="1" fontAlgn="auto" latinLnBrk="0" hangingPunct="1">
+              <a:lnSpc>
+                <a:spcPct val="90000"/>
+              </a:lnSpc>
+              <a:spcBef>
+                <a:spcPts val="1000"/>
+              </a:spcBef>
+              <a:spcAft>
+                <a:spcPts val="0"/>
+              </a:spcAft>
+              <a:buClrTx/>
+              <a:buSzTx/>
+              <a:buFont typeface="Arial" pitchFamily="34" charset="0"/>
+              <a:buChar char="•"/>
+              <a:tabLst/>
+              <a:defRPr/>
+            </a:pPr>
+            <a:endParaRPr lang="hu-HU" sz="2400" dirty="0"/>
+          </a:p>
+          <a:p>
+            <a:pPr marL="0" marR="0" lvl="0" indent="0" defTabSz="914400" rtl="0" eaLnBrk="1" fontAlgn="auto" latinLnBrk="0" hangingPunct="1">
+              <a:lnSpc>
+                <a:spcPct val="90000"/>
+              </a:lnSpc>
+              <a:spcBef>
+                <a:spcPts val="1000"/>
+              </a:spcBef>
+              <a:spcAft>
+                <a:spcPts val="0"/>
+              </a:spcAft>
+              <a:buClrTx/>
+              <a:buSzTx/>
+              <a:buFont typeface="Arial" pitchFamily="34" charset="0"/>
+              <a:buChar char="•"/>
+              <a:tabLst/>
+              <a:defRPr/>
+            </a:pPr>
+            <a:endParaRPr lang="hu-HU" sz="2400" baseline="0" dirty="0"/>
+          </a:p>
+        </p:txBody>
+      </p:sp>
+      <p:sp>
+        <p:nvSpPr>
+          <p:cNvPr id="4" name="Szövegdoboz 3"/>
+          <p:cNvSpPr txBox="1"/>
+          <p:nvPr/>
+        </p:nvSpPr>
+        <p:spPr>
+          <a:xfrm>
+            <a:off x="484221" y="2049507"/>
+            <a:ext cx="8604354" cy="1815882"/>
+          </a:xfrm>
+          <a:prstGeom prst="rect">
+            <a:avLst/>
+          </a:prstGeom>
+          <a:noFill/>
+        </p:spPr>
+        <p:txBody>
+          <a:bodyPr wrap="square" rtlCol="0">
+            <a:spAutoFit/>
+          </a:bodyPr>
+          <a:lstStyle/>
+          <a:p>
+            <a:pPr marL="285750" indent="-285750">
+              <a:buFont typeface="Arial" panose="020B0604020202020204" pitchFamily="34" charset="0"/>
+              <a:buChar char="•"/>
+            </a:pPr>
+            <a:r>
+              <a:rPr lang="hu-HU" sz="2800" dirty="0"/>
+              <a:t>Hibajegyek létrehozása (felület és implementáció)</a:t>
+            </a:r>
+          </a:p>
+          <a:p>
+            <a:pPr marL="285750" indent="-285750">
+              <a:buFont typeface="Arial" panose="020B0604020202020204" pitchFamily="34" charset="0"/>
+              <a:buChar char="•"/>
+            </a:pPr>
+            <a:r>
+              <a:rPr lang="hu-HU" sz="2800" dirty="0"/>
+              <a:t>Hibajegyek módosítása + </a:t>
+            </a:r>
+            <a:r>
+              <a:rPr lang="hu-HU" sz="2800" dirty="0" err="1"/>
+              <a:t>Userek</a:t>
+            </a:r>
+            <a:r>
+              <a:rPr lang="hu-HU" sz="2800" dirty="0"/>
+              <a:t> </a:t>
+            </a:r>
+            <a:r>
+              <a:rPr lang="hu-HU" sz="2800" dirty="0" err="1"/>
+              <a:t>tickethez</a:t>
+            </a:r>
+            <a:r>
+              <a:rPr lang="hu-HU" sz="2800" dirty="0"/>
+              <a:t> rendelése</a:t>
+            </a:r>
+          </a:p>
+          <a:p>
+            <a:pPr marL="285750" indent="-285750">
+              <a:buFont typeface="Arial" panose="020B0604020202020204" pitchFamily="34" charset="0"/>
+              <a:buChar char="•"/>
+            </a:pPr>
+            <a:r>
+              <a:rPr lang="hu-HU" sz="2800" dirty="0" err="1"/>
+              <a:t>Logolás</a:t>
+            </a:r>
+            <a:r>
+              <a:rPr lang="hu-HU" sz="2800" dirty="0"/>
+              <a:t> kialakítása a projektben</a:t>
+            </a:r>
+          </a:p>
+          <a:p>
+            <a:pPr marL="285750" indent="-285750">
+              <a:buFont typeface="Arial" panose="020B0604020202020204" pitchFamily="34" charset="0"/>
+              <a:buChar char="•"/>
+            </a:pPr>
+            <a:r>
+              <a:rPr lang="hu-HU" sz="2800" dirty="0" err="1"/>
+              <a:t>Junit</a:t>
+            </a:r>
+            <a:r>
+              <a:rPr lang="hu-HU" sz="2800" dirty="0"/>
+              <a:t> tesztek írása</a:t>
+            </a:r>
+          </a:p>
+        </p:txBody>
+      </p:sp>
+      <p:sp>
+        <p:nvSpPr>
+          <p:cNvPr id="6" name="Cím 1"/>
+          <p:cNvSpPr txBox="1">
+            <a:spLocks/>
+          </p:cNvSpPr>
+          <p:nvPr/>
+        </p:nvSpPr>
+        <p:spPr>
+          <a:xfrm rot="20305361">
+            <a:off x="7446477" y="153351"/>
+            <a:ext cx="1548465" cy="417968"/>
+          </a:xfrm>
+          <a:prstGeom prst="rect">
+            <a:avLst/>
+          </a:prstGeom>
+        </p:spPr>
+        <p:txBody>
+          <a:bodyPr vert="horz" lIns="91440" tIns="45720" rIns="91440" bIns="45720" rtlCol="0" anchor="b">
+            <a:normAutofit/>
+          </a:bodyPr>
+          <a:lstStyle>
+            <a:lvl1pPr algn="ctr" defTabSz="914400" rtl="0" eaLnBrk="1" latinLnBrk="0" hangingPunct="1">
+              <a:lnSpc>
+                <a:spcPct val="90000"/>
+              </a:lnSpc>
+              <a:spcBef>
+                <a:spcPct val="0"/>
+              </a:spcBef>
+              <a:buNone/>
+              <a:defRPr sz="6000" kern="1200">
+                <a:solidFill>
+                  <a:schemeClr val="tx1"/>
+                </a:solidFill>
+                <a:latin typeface="+mj-lt"/>
+                <a:ea typeface="+mj-ea"/>
+                <a:cs typeface="+mj-cs"/>
+              </a:defRPr>
+            </a:lvl1pPr>
+          </a:lstStyle>
+          <a:p>
+            <a:r>
+              <a:rPr lang="hu-HU" sz="1800"/>
+              <a:t>Issue Tracker</a:t>
+            </a:r>
+            <a:endParaRPr lang="hu-HU" sz="1800" dirty="0"/>
+          </a:p>
+        </p:txBody>
+      </p:sp>
+    </p:spTree>
+    <p:extLst>
+      <p:ext uri="{BB962C8B-B14F-4D97-AF65-F5344CB8AC3E}">
+        <p14:creationId xmlns:p14="http://schemas.microsoft.com/office/powerpoint/2010/main" val="2663666300"/>
+      </p:ext>
+    </p:extLst>
+  </p:cSld>
+  <p:clrMapOvr>
+    <a:masterClrMapping/>
+  </p:clrMapOvr>
+</p:sld>
+</file>
+
+<file path=ppt/slides/slide7.xml><?xml version="1.0" encoding="utf-8"?>
+<p:sld xmlns:a="http://schemas.openxmlformats.org/drawingml/2006/main" xmlns:r="http://schemas.openxmlformats.org/officeDocument/2006/relationships" xmlns:p="http://schemas.openxmlformats.org/presentationml/2006/main">
+  <p:cSld>
+    <p:spTree>
+      <p:nvGrpSpPr>
+        <p:cNvPr id="1" name=""/>
+        <p:cNvGrpSpPr/>
+        <p:nvPr/>
+      </p:nvGrpSpPr>
+      <p:grpSpPr>
+        <a:xfrm>
+          <a:off x="0" y="0"/>
+          <a:ext cx="0" cy="0"/>
+          <a:chOff x="0" y="0"/>
+          <a:chExt cx="0" cy="0"/>
+        </a:xfrm>
+      </p:grpSpPr>
+      <p:sp>
+        <p:nvSpPr>
           <p:cNvPr id="2" name="Cím 1"/>
           <p:cNvSpPr>
             <a:spLocks noGrp="1"/>
@@ -5041,7 +5563,295 @@
 </p:sld>
 </file>
 
-<file path=ppt/slides/slide7.xml><?xml version="1.0" encoding="utf-8"?>
+<file path=ppt/slides/slide8.xml><?xml version="1.0" encoding="utf-8"?>
+<p:sld xmlns:a="http://schemas.openxmlformats.org/drawingml/2006/main" xmlns:r="http://schemas.openxmlformats.org/officeDocument/2006/relationships" xmlns:p="http://schemas.openxmlformats.org/presentationml/2006/main">
+  <p:cSld>
+    <p:spTree>
+      <p:nvGrpSpPr>
+        <p:cNvPr id="1" name=""/>
+        <p:cNvGrpSpPr/>
+        <p:nvPr/>
+      </p:nvGrpSpPr>
+      <p:grpSpPr>
+        <a:xfrm>
+          <a:off x="0" y="0"/>
+          <a:ext cx="0" cy="0"/>
+          <a:chOff x="0" y="0"/>
+          <a:chExt cx="0" cy="0"/>
+        </a:xfrm>
+      </p:grpSpPr>
+      <p:sp>
+        <p:nvSpPr>
+          <p:cNvPr id="3" name="Alcím 2"/>
+          <p:cNvSpPr>
+            <a:spLocks noGrp="1"/>
+          </p:cNvSpPr>
+          <p:nvPr>
+            <p:ph type="subTitle" idx="1"/>
+          </p:nvPr>
+        </p:nvSpPr>
+        <p:spPr>
+          <a:xfrm>
+            <a:off x="2532393" y="1024933"/>
+            <a:ext cx="3814688" cy="434696"/>
+          </a:xfrm>
+        </p:spPr>
+        <p:txBody>
+          <a:bodyPr>
+            <a:noAutofit/>
+          </a:bodyPr>
+          <a:lstStyle/>
+          <a:p>
+            <a:r>
+              <a:rPr lang="hu-HU" sz="3200" u="sng" dirty="0"/>
+              <a:t>Amit kaptam:</a:t>
+            </a:r>
+          </a:p>
+          <a:p>
+            <a:endParaRPr lang="hu-HU" sz="3200" dirty="0"/>
+          </a:p>
+        </p:txBody>
+      </p:sp>
+      <p:sp>
+        <p:nvSpPr>
+          <p:cNvPr id="5" name="Tartalom helye 2"/>
+          <p:cNvSpPr txBox="1">
+            <a:spLocks/>
+          </p:cNvSpPr>
+          <p:nvPr/>
+        </p:nvSpPr>
+        <p:spPr>
+          <a:xfrm>
+            <a:off x="484221" y="1459630"/>
+            <a:ext cx="5388758" cy="2995637"/>
+          </a:xfrm>
+          <a:prstGeom prst="rect">
+            <a:avLst/>
+          </a:prstGeom>
+        </p:spPr>
+        <p:txBody>
+          <a:bodyPr vert="horz" lIns="91440" tIns="45720" rIns="91440" bIns="45720" rtlCol="0">
+            <a:noAutofit/>
+          </a:bodyPr>
+          <a:lstStyle/>
+          <a:p>
+            <a:pPr marL="0" marR="0" lvl="0" indent="0" defTabSz="914400" rtl="0" eaLnBrk="1" fontAlgn="auto" latinLnBrk="0" hangingPunct="1">
+              <a:lnSpc>
+                <a:spcPct val="90000"/>
+              </a:lnSpc>
+              <a:spcBef>
+                <a:spcPts val="1000"/>
+              </a:spcBef>
+              <a:spcAft>
+                <a:spcPts val="0"/>
+              </a:spcAft>
+              <a:buClrTx/>
+              <a:buSzTx/>
+              <a:buFont typeface="Arial" pitchFamily="34" charset="0"/>
+              <a:buChar char="•"/>
+              <a:tabLst/>
+              <a:defRPr/>
+            </a:pPr>
+            <a:endParaRPr lang="hu-HU" sz="2400" dirty="0"/>
+          </a:p>
+          <a:p>
+            <a:pPr marL="0" marR="0" lvl="0" indent="0" defTabSz="914400" rtl="0" eaLnBrk="1" fontAlgn="auto" latinLnBrk="0" hangingPunct="1">
+              <a:lnSpc>
+                <a:spcPct val="90000"/>
+              </a:lnSpc>
+              <a:spcBef>
+                <a:spcPts val="1000"/>
+              </a:spcBef>
+              <a:spcAft>
+                <a:spcPts val="0"/>
+              </a:spcAft>
+              <a:buClrTx/>
+              <a:buSzTx/>
+              <a:buFont typeface="Arial" pitchFamily="34" charset="0"/>
+              <a:buChar char="•"/>
+              <a:tabLst/>
+              <a:defRPr/>
+            </a:pPr>
+            <a:endParaRPr lang="hu-HU" sz="2400" dirty="0"/>
+          </a:p>
+          <a:p>
+            <a:pPr marL="0" marR="0" lvl="0" indent="0" defTabSz="914400" rtl="0" eaLnBrk="1" fontAlgn="auto" latinLnBrk="0" hangingPunct="1">
+              <a:lnSpc>
+                <a:spcPct val="90000"/>
+              </a:lnSpc>
+              <a:spcBef>
+                <a:spcPts val="1000"/>
+              </a:spcBef>
+              <a:spcAft>
+                <a:spcPts val="0"/>
+              </a:spcAft>
+              <a:buClrTx/>
+              <a:buSzTx/>
+              <a:buFont typeface="Arial" pitchFamily="34" charset="0"/>
+              <a:buChar char="•"/>
+              <a:tabLst/>
+              <a:defRPr/>
+            </a:pPr>
+            <a:endParaRPr lang="hu-HU" sz="2400" dirty="0"/>
+          </a:p>
+          <a:p>
+            <a:pPr marL="0" marR="0" lvl="0" indent="0" defTabSz="914400" rtl="0" eaLnBrk="1" fontAlgn="auto" latinLnBrk="0" hangingPunct="1">
+              <a:lnSpc>
+                <a:spcPct val="90000"/>
+              </a:lnSpc>
+              <a:spcBef>
+                <a:spcPts val="1000"/>
+              </a:spcBef>
+              <a:spcAft>
+                <a:spcPts val="0"/>
+              </a:spcAft>
+              <a:buClrTx/>
+              <a:buSzTx/>
+              <a:buFont typeface="Arial" pitchFamily="34" charset="0"/>
+              <a:buChar char="•"/>
+              <a:tabLst/>
+              <a:defRPr/>
+            </a:pPr>
+            <a:endParaRPr lang="hu-HU" sz="2400" dirty="0"/>
+          </a:p>
+          <a:p>
+            <a:pPr marL="0" marR="0" lvl="0" indent="0" defTabSz="914400" rtl="0" eaLnBrk="1" fontAlgn="auto" latinLnBrk="0" hangingPunct="1">
+              <a:lnSpc>
+                <a:spcPct val="90000"/>
+              </a:lnSpc>
+              <a:spcBef>
+                <a:spcPts val="1000"/>
+              </a:spcBef>
+              <a:spcAft>
+                <a:spcPts val="0"/>
+              </a:spcAft>
+              <a:buClrTx/>
+              <a:buSzTx/>
+              <a:buFont typeface="Arial" pitchFamily="34" charset="0"/>
+              <a:buChar char="•"/>
+              <a:tabLst/>
+              <a:defRPr/>
+            </a:pPr>
+            <a:endParaRPr lang="hu-HU" sz="2400" baseline="0" dirty="0"/>
+          </a:p>
+        </p:txBody>
+      </p:sp>
+      <p:sp>
+        <p:nvSpPr>
+          <p:cNvPr id="4" name="Szövegdoboz 3"/>
+          <p:cNvSpPr txBox="1"/>
+          <p:nvPr/>
+        </p:nvSpPr>
+        <p:spPr>
+          <a:xfrm>
+            <a:off x="484221" y="2049507"/>
+            <a:ext cx="8604354" cy="1384995"/>
+          </a:xfrm>
+          <a:prstGeom prst="rect">
+            <a:avLst/>
+          </a:prstGeom>
+          <a:noFill/>
+        </p:spPr>
+        <p:txBody>
+          <a:bodyPr wrap="square" rtlCol="0">
+            <a:spAutoFit/>
+          </a:bodyPr>
+          <a:lstStyle/>
+          <a:p>
+            <a:pPr marL="285750" indent="-285750">
+              <a:buFont typeface="Arial" panose="020B0604020202020204" pitchFamily="34" charset="0"/>
+              <a:buChar char="•"/>
+            </a:pPr>
+            <a:r>
+              <a:rPr lang="hu-HU" sz="2800" dirty="0"/>
+              <a:t>Használható korszerű tudás</a:t>
+            </a:r>
+          </a:p>
+          <a:p>
+            <a:pPr marL="285750" indent="-285750">
+              <a:buFont typeface="Arial" panose="020B0604020202020204" pitchFamily="34" charset="0"/>
+              <a:buChar char="•"/>
+            </a:pPr>
+            <a:r>
+              <a:rPr lang="hu-HU" sz="2800" dirty="0"/>
+              <a:t>Tapasztalat</a:t>
+            </a:r>
+          </a:p>
+          <a:p>
+            <a:pPr marL="285750" indent="-285750">
+              <a:buFont typeface="Arial" panose="020B0604020202020204" pitchFamily="34" charset="0"/>
+              <a:buChar char="•"/>
+            </a:pPr>
+            <a:r>
+              <a:rPr lang="hu-HU" sz="2800" dirty="0"/>
+              <a:t>Csapatmunka </a:t>
+            </a:r>
+          </a:p>
+        </p:txBody>
+      </p:sp>
+      <p:sp>
+        <p:nvSpPr>
+          <p:cNvPr id="6" name="Cím 1"/>
+          <p:cNvSpPr txBox="1">
+            <a:spLocks/>
+          </p:cNvSpPr>
+          <p:nvPr/>
+        </p:nvSpPr>
+        <p:spPr>
+          <a:xfrm rot="20305361">
+            <a:off x="7446477" y="153351"/>
+            <a:ext cx="1548465" cy="417968"/>
+          </a:xfrm>
+          <a:prstGeom prst="rect">
+            <a:avLst/>
+          </a:prstGeom>
+        </p:spPr>
+        <p:txBody>
+          <a:bodyPr vert="horz" lIns="91440" tIns="45720" rIns="91440" bIns="45720" rtlCol="0" anchor="b">
+            <a:normAutofit/>
+          </a:bodyPr>
+          <a:lstStyle>
+            <a:lvl1pPr algn="ctr" defTabSz="914400" rtl="0" eaLnBrk="1" latinLnBrk="0" hangingPunct="1">
+              <a:lnSpc>
+                <a:spcPct val="90000"/>
+              </a:lnSpc>
+              <a:spcBef>
+                <a:spcPct val="0"/>
+              </a:spcBef>
+              <a:buNone/>
+              <a:defRPr sz="6000" kern="1200">
+                <a:solidFill>
+                  <a:schemeClr val="tx1"/>
+                </a:solidFill>
+                <a:latin typeface="+mj-lt"/>
+                <a:ea typeface="+mj-ea"/>
+                <a:cs typeface="+mj-cs"/>
+              </a:defRPr>
+            </a:lvl1pPr>
+          </a:lstStyle>
+          <a:p>
+            <a:r>
+              <a:rPr lang="hu-HU" sz="1800"/>
+              <a:t>Issue Tracker</a:t>
+            </a:r>
+            <a:endParaRPr lang="hu-HU" sz="1800" dirty="0"/>
+          </a:p>
+        </p:txBody>
+      </p:sp>
+    </p:spTree>
+    <p:extLst>
+      <p:ext uri="{BB962C8B-B14F-4D97-AF65-F5344CB8AC3E}">
+        <p14:creationId xmlns:p14="http://schemas.microsoft.com/office/powerpoint/2010/main" val="2769097114"/>
+      </p:ext>
+    </p:extLst>
+  </p:cSld>
+  <p:clrMapOvr>
+    <a:masterClrMapping/>
+  </p:clrMapOvr>
+</p:sld>
+</file>
+
+<file path=ppt/slides/slide9.xml><?xml version="1.0" encoding="utf-8"?>
 <p:sld xmlns:a="http://schemas.openxmlformats.org/drawingml/2006/main" xmlns:r="http://schemas.openxmlformats.org/officeDocument/2006/relationships" xmlns:p="http://schemas.openxmlformats.org/presentationml/2006/main">
   <p:cSld>
     <p:bg>
@@ -6016,15 +6826,15 @@
 <file path=customXml/itemProps2.xml><?xml version="1.0" encoding="utf-8"?>
 <ds:datastoreItem xmlns:ds="http://schemas.openxmlformats.org/officeDocument/2006/customXml" ds:itemID="{8E1455B4-EFFE-4AEE-ADC2-FE51D16F6234}">
   <ds:schemaRefs>
+    <ds:schemaRef ds:uri="http://purl.org/dc/elements/1.1/"/>
     <ds:schemaRef ds:uri="http://schemas.microsoft.com/office/2006/documentManagement/types"/>
-    <ds:schemaRef ds:uri="http://purl.org/dc/elements/1.1/"/>
+    <ds:schemaRef ds:uri="http://purl.org/dc/dcmitype/"/>
+    <ds:schemaRef ds:uri="http://purl.org/dc/terms/"/>
     <ds:schemaRef ds:uri="http://schemas.microsoft.com/office/infopath/2007/PartnerControls"/>
-    <ds:schemaRef ds:uri="http://purl.org/dc/terms/"/>
-    <ds:schemaRef ds:uri="http://schemas.microsoft.com/office/2006/metadata/properties"/>
     <ds:schemaRef ds:uri="http://schemas.openxmlformats.org/package/2006/metadata/core-properties"/>
     <ds:schemaRef ds:uri="9a324a02-be43-499b-8089-7896e70993e7"/>
+    <ds:schemaRef ds:uri="http://schemas.microsoft.com/office/2006/metadata/properties"/>
     <ds:schemaRef ds:uri="http://www.w3.org/XML/1998/namespace"/>
-    <ds:schemaRef ds:uri="http://purl.org/dc/dcmitype/"/>
   </ds:schemaRefs>
 </ds:datastoreItem>
 </file>

</xml_diff>